<commit_message>
key featuresa + Benefits (Slides 80%)
</commit_message>
<xml_diff>
--- a/Documents/FINAL/ProCp-Project-Core-phase -without some slides.pptx
+++ b/Documents/FINAL/ProCp-Project-Core-phase -without some slides.pptx
@@ -5,7 +5,7 @@
     <p:sldMasterId id="2147483648" r:id="rId1"/>
   </p:sldMasterIdLst>
   <p:notesMasterIdLst>
-    <p:notesMasterId r:id="rId9"/>
+    <p:notesMasterId r:id="rId10"/>
   </p:notesMasterIdLst>
   <p:sldIdLst>
     <p:sldId id="256" r:id="rId2"/>
@@ -13,8 +13,9 @@
     <p:sldId id="279" r:id="rId4"/>
     <p:sldId id="274" r:id="rId5"/>
     <p:sldId id="276" r:id="rId6"/>
-    <p:sldId id="267" r:id="rId7"/>
-    <p:sldId id="278" r:id="rId8"/>
+    <p:sldId id="280" r:id="rId7"/>
+    <p:sldId id="267" r:id="rId8"/>
+    <p:sldId id="278" r:id="rId9"/>
   </p:sldIdLst>
   <p:sldSz cx="12192000" cy="6858000"/>
   <p:notesSz cx="6858000" cy="9144000"/>
@@ -794,6 +795,114 @@
     <p:extLst>
       <p:ext uri="{BB962C8B-B14F-4D97-AF65-F5344CB8AC3E}">
         <p14:creationId xmlns:p14="http://schemas.microsoft.com/office/powerpoint/2010/main" val="3821249481"/>
+      </p:ext>
+    </p:extLst>
+  </p:cSld>
+  <p:clrMapOvr>
+    <a:masterClrMapping/>
+  </p:clrMapOvr>
+</p:notes>
+</file>
+
+<file path=ppt/notesSlides/notesSlide4.xml><?xml version="1.0" encoding="utf-8"?>
+<p:notes xmlns:a="http://schemas.openxmlformats.org/drawingml/2006/main" xmlns:r="http://schemas.openxmlformats.org/officeDocument/2006/relationships" xmlns:p="http://schemas.openxmlformats.org/presentationml/2006/main">
+  <p:cSld>
+    <p:spTree>
+      <p:nvGrpSpPr>
+        <p:cNvPr id="1" name=""/>
+        <p:cNvGrpSpPr/>
+        <p:nvPr/>
+      </p:nvGrpSpPr>
+      <p:grpSpPr>
+        <a:xfrm>
+          <a:off x="0" y="0"/>
+          <a:ext cx="0" cy="0"/>
+          <a:chOff x="0" y="0"/>
+          <a:chExt cx="0" cy="0"/>
+        </a:xfrm>
+      </p:grpSpPr>
+      <p:sp>
+        <p:nvSpPr>
+          <p:cNvPr id="2" name="Slide Image Placeholder 1"/>
+          <p:cNvSpPr>
+            <a:spLocks noGrp="1" noRot="1" noChangeAspect="1"/>
+          </p:cNvSpPr>
+          <p:nvPr>
+            <p:ph type="sldImg"/>
+          </p:nvPr>
+        </p:nvSpPr>
+        <p:spPr/>
+      </p:sp>
+      <p:sp>
+        <p:nvSpPr>
+          <p:cNvPr id="3" name="Notes Placeholder 2"/>
+          <p:cNvSpPr>
+            <a:spLocks noGrp="1"/>
+          </p:cNvSpPr>
+          <p:nvPr>
+            <p:ph type="body" idx="1"/>
+          </p:nvPr>
+        </p:nvSpPr>
+        <p:spPr/>
+        <p:txBody>
+          <a:bodyPr/>
+          <a:lstStyle/>
+          <a:p>
+            <a:pPr marL="0" marR="0" lvl="0" indent="0" algn="l" defTabSz="914400" rtl="0" eaLnBrk="1" fontAlgn="auto" latinLnBrk="0" hangingPunct="1">
+              <a:lnSpc>
+                <a:spcPct val="100000"/>
+              </a:lnSpc>
+              <a:spcBef>
+                <a:spcPts val="0"/>
+              </a:spcBef>
+              <a:spcAft>
+                <a:spcPts val="0"/>
+              </a:spcAft>
+              <a:buClrTx/>
+              <a:buSzTx/>
+              <a:buFontTx/>
+              <a:buNone/>
+              <a:tabLst/>
+              <a:defRPr/>
+            </a:pPr>
+            <a:r>
+              <a:rPr lang="en-US" dirty="0"/>
+              <a:t>Explaining another key features of the app</a:t>
+            </a:r>
+            <a:endParaRPr lang="bg-BG" dirty="0"/>
+          </a:p>
+          <a:p>
+            <a:endParaRPr lang="bg-BG" dirty="0"/>
+          </a:p>
+        </p:txBody>
+      </p:sp>
+      <p:sp>
+        <p:nvSpPr>
+          <p:cNvPr id="4" name="Slide Number Placeholder 3"/>
+          <p:cNvSpPr>
+            <a:spLocks noGrp="1"/>
+          </p:cNvSpPr>
+          <p:nvPr>
+            <p:ph type="sldNum" sz="quarter" idx="10"/>
+          </p:nvPr>
+        </p:nvSpPr>
+        <p:spPr/>
+        <p:txBody>
+          <a:bodyPr/>
+          <a:lstStyle/>
+          <a:p>
+            <a:fld id="{FE574705-76D7-453A-8519-6907CC78C8CA}" type="slidenum">
+              <a:rPr lang="bg-BG" smtClean="0"/>
+              <a:t>6</a:t>
+            </a:fld>
+            <a:endParaRPr lang="bg-BG"/>
+          </a:p>
+        </p:txBody>
+      </p:sp>
+    </p:spTree>
+    <p:extLst>
+      <p:ext uri="{BB962C8B-B14F-4D97-AF65-F5344CB8AC3E}">
+        <p14:creationId xmlns:p14="http://schemas.microsoft.com/office/powerpoint/2010/main" val="3184712399"/>
       </p:ext>
     </p:extLst>
   </p:cSld>
@@ -13303,19 +13412,20 @@
           <a:p>
             <a:r>
               <a:rPr lang="en-US" dirty="0"/>
+              <a:t>RCAEA overview</a:t>
+            </a:r>
+            <a:endParaRPr lang="en-US" dirty="0"/>
+          </a:p>
+          <a:p>
+            <a:r>
+              <a:rPr lang="en-US" dirty="0"/>
+              <a:t> key features</a:t>
+            </a:r>
+          </a:p>
+          <a:p>
+            <a:r>
+              <a:rPr lang="en-US" dirty="0"/>
               <a:t>Benefits</a:t>
-            </a:r>
-          </a:p>
-          <a:p>
-            <a:r>
-              <a:rPr lang="en-US" dirty="0"/>
-              <a:t>Benefit 1 </a:t>
-            </a:r>
-          </a:p>
-          <a:p>
-            <a:r>
-              <a:rPr lang="en-US" dirty="0"/>
-              <a:t>Benefit n ..</a:t>
             </a:r>
           </a:p>
           <a:p>
@@ -13381,7 +13491,6 @@
               <a:rPr lang="en-US" sz="4000" dirty="0"/>
               <a:t>RCAEA</a:t>
             </a:r>
-            <a:endParaRPr lang="en-US" sz="4000" dirty="0"/>
           </a:p>
         </p:txBody>
       </p:sp>
@@ -13461,8 +13570,13 @@
             <a:pPr algn="ctr"/>
             <a:r>
               <a:rPr lang="en-US" sz="4000" dirty="0"/>
-              <a:t>Simulates </a:t>
-            </a:r>
+              <a:t>RCAEA </a:t>
+            </a:r>
+            <a:r>
+              <a:rPr lang="en-US" sz="4000" dirty="0"/>
+              <a:t>overview</a:t>
+            </a:r>
+            <a:endParaRPr lang="en-US" sz="4000" dirty="0"/>
           </a:p>
         </p:txBody>
       </p:sp>
@@ -13565,8 +13679,9 @@
             <a:pPr algn="ctr"/>
             <a:r>
               <a:rPr lang="en-US" sz="4000" dirty="0"/>
-              <a:t>Benefits</a:t>
-            </a:r>
+              <a:t> key features</a:t>
+            </a:r>
+            <a:endParaRPr lang="en-US" sz="4000" dirty="0"/>
           </a:p>
         </p:txBody>
       </p:sp>
@@ -13589,35 +13704,32 @@
           <a:p>
             <a:r>
               <a:rPr lang="en-US" dirty="0"/>
-              <a:t>Efficiently using water resources</a:t>
+              <a:t>Easy to Save simulation</a:t>
             </a:r>
           </a:p>
           <a:p>
             <a:r>
               <a:rPr lang="en-US" dirty="0"/>
-              <a:t>Efficiently using fertilizer</a:t>
+              <a:t>Easy to load simulation</a:t>
             </a:r>
           </a:p>
           <a:p>
             <a:r>
               <a:rPr lang="en-US" dirty="0"/>
-              <a:t>Efficiently using arable land</a:t>
+              <a:t>Easy to visualize crop growth</a:t>
             </a:r>
           </a:p>
           <a:p>
             <a:r>
               <a:rPr lang="en-US" dirty="0"/>
-              <a:t>Minimizing harvesting cost</a:t>
+              <a:t>Easy to calculate harvesting cost</a:t>
             </a:r>
           </a:p>
           <a:p>
             <a:r>
               <a:rPr lang="en-US" dirty="0"/>
-              <a:t>Maximizing profit</a:t>
-            </a:r>
-          </a:p>
-          <a:p>
-            <a:endParaRPr lang="en-US" dirty="0"/>
+              <a:t>Easy to calculate the profit</a:t>
+            </a:r>
           </a:p>
         </p:txBody>
       </p:sp>
@@ -13635,6 +13747,115 @@
 </file>
 
 <file path=ppt/slides/slide6.xml><?xml version="1.0" encoding="utf-8"?>
+<p:sld xmlns:a="http://schemas.openxmlformats.org/drawingml/2006/main" xmlns:r="http://schemas.openxmlformats.org/officeDocument/2006/relationships" xmlns:p="http://schemas.openxmlformats.org/presentationml/2006/main">
+  <p:cSld>
+    <p:spTree>
+      <p:nvGrpSpPr>
+        <p:cNvPr id="1" name=""/>
+        <p:cNvGrpSpPr/>
+        <p:nvPr/>
+      </p:nvGrpSpPr>
+      <p:grpSpPr>
+        <a:xfrm>
+          <a:off x="0" y="0"/>
+          <a:ext cx="0" cy="0"/>
+          <a:chOff x="0" y="0"/>
+          <a:chExt cx="0" cy="0"/>
+        </a:xfrm>
+      </p:grpSpPr>
+      <p:sp>
+        <p:nvSpPr>
+          <p:cNvPr id="2" name="Title 1"/>
+          <p:cNvSpPr>
+            <a:spLocks noGrp="1"/>
+          </p:cNvSpPr>
+          <p:nvPr>
+            <p:ph type="title"/>
+          </p:nvPr>
+        </p:nvSpPr>
+        <p:spPr>
+          <a:xfrm>
+            <a:off x="1154954" y="973669"/>
+            <a:ext cx="8825659" cy="988946"/>
+          </a:xfrm>
+        </p:spPr>
+        <p:txBody>
+          <a:bodyPr/>
+          <a:lstStyle/>
+          <a:p>
+            <a:pPr algn="ctr"/>
+            <a:r>
+              <a:rPr lang="en-US" sz="4000" dirty="0"/>
+              <a:t>Benefits</a:t>
+            </a:r>
+          </a:p>
+        </p:txBody>
+      </p:sp>
+      <p:sp>
+        <p:nvSpPr>
+          <p:cNvPr id="5" name="Content Placeholder 4"/>
+          <p:cNvSpPr>
+            <a:spLocks noGrp="1"/>
+          </p:cNvSpPr>
+          <p:nvPr>
+            <p:ph idx="1"/>
+          </p:nvPr>
+        </p:nvSpPr>
+        <p:spPr/>
+        <p:txBody>
+          <a:bodyPr>
+            <a:normAutofit/>
+          </a:bodyPr>
+          <a:lstStyle/>
+          <a:p>
+            <a:r>
+              <a:rPr lang="en-US" dirty="0"/>
+              <a:t>Efficiently using water resources</a:t>
+            </a:r>
+          </a:p>
+          <a:p>
+            <a:r>
+              <a:rPr lang="en-US" dirty="0"/>
+              <a:t>Efficiently using fertilizer</a:t>
+            </a:r>
+          </a:p>
+          <a:p>
+            <a:r>
+              <a:rPr lang="en-US" dirty="0"/>
+              <a:t>Efficiently using arable land</a:t>
+            </a:r>
+          </a:p>
+          <a:p>
+            <a:r>
+              <a:rPr lang="en-US" dirty="0"/>
+              <a:t>Minimizing harvesting cost</a:t>
+            </a:r>
+          </a:p>
+          <a:p>
+            <a:r>
+              <a:rPr lang="en-US" dirty="0"/>
+              <a:t>Maximizing profit</a:t>
+            </a:r>
+          </a:p>
+          <a:p>
+            <a:endParaRPr lang="en-US" dirty="0"/>
+          </a:p>
+        </p:txBody>
+      </p:sp>
+    </p:spTree>
+    <p:extLst>
+      <p:ext uri="{BB962C8B-B14F-4D97-AF65-F5344CB8AC3E}">
+        <p14:creationId xmlns:p14="http://schemas.microsoft.com/office/powerpoint/2010/main" val="769324445"/>
+      </p:ext>
+    </p:extLst>
+  </p:cSld>
+  <p:clrMapOvr>
+    <a:masterClrMapping/>
+  </p:clrMapOvr>
+</p:sld>
+</file>
+
+<file path=ppt/slides/slide7.xml><?xml version="1.0" encoding="utf-8"?>
 <p:sld xmlns:a="http://schemas.openxmlformats.org/drawingml/2006/main" xmlns:r="http://schemas.openxmlformats.org/officeDocument/2006/relationships" xmlns:p="http://schemas.openxmlformats.org/presentationml/2006/main">
   <p:cSld>
     <p:spTree>
@@ -14146,7 +14367,7 @@
 </p:sld>
 </file>
 
-<file path=ppt/slides/slide7.xml><?xml version="1.0" encoding="utf-8"?>
+<file path=ppt/slides/slide8.xml><?xml version="1.0" encoding="utf-8"?>
 <p:sld xmlns:a="http://schemas.openxmlformats.org/drawingml/2006/main" xmlns:r="http://schemas.openxmlformats.org/officeDocument/2006/relationships" xmlns:p="http://schemas.openxmlformats.org/presentationml/2006/main">
   <p:cSld>
     <p:spTree>

</xml_diff>